<commit_message>
Mapa,manus y escaleta CN_07_09_co entornoed
</commit_message>
<xml_diff>
--- a/fuentes/contenidos/grado07/guion09/CN_07_09-CORREGIDO.pptx
+++ b/fuentes/contenidos/grado07/guion09/CN_07_09-CORREGIDO.pptx
@@ -156,13 +156,6 @@
   <p:clrMapOvr>
     <a:masterClrMapping/>
   </p:clrMapOvr>
-  <p:timing>
-    <p:tnLst>
-      <p:par>
-        <p:cTn id="1" dur="indefinite" restart="never" nodeType="tmRoot"/>
-      </p:par>
-    </p:tnLst>
-  </p:timing>
 </p:sldLayout>
 </file>
 
@@ -193,13 +186,6 @@
   <p:clrMapOvr>
     <a:masterClrMapping/>
   </p:clrMapOvr>
-  <p:timing>
-    <p:tnLst>
-      <p:par>
-        <p:cTn id="1" dur="indefinite" restart="never" nodeType="tmRoot"/>
-      </p:par>
-    </p:tnLst>
-  </p:timing>
 </p:sldLayout>
 </file>
 
@@ -230,13 +216,6 @@
   <p:clrMapOvr>
     <a:masterClrMapping/>
   </p:clrMapOvr>
-  <p:timing>
-    <p:tnLst>
-      <p:par>
-        <p:cTn id="1" dur="indefinite" restart="never" nodeType="tmRoot"/>
-      </p:par>
-    </p:tnLst>
-  </p:timing>
 </p:sldLayout>
 </file>
 
@@ -267,13 +246,6 @@
   <p:clrMapOvr>
     <a:masterClrMapping/>
   </p:clrMapOvr>
-  <p:timing>
-    <p:tnLst>
-      <p:par>
-        <p:cTn id="1" dur="indefinite" restart="never" nodeType="tmRoot"/>
-      </p:par>
-    </p:tnLst>
-  </p:timing>
 </p:sldLayout>
 </file>
 
@@ -304,13 +276,6 @@
   <p:clrMapOvr>
     <a:masterClrMapping/>
   </p:clrMapOvr>
-  <p:timing>
-    <p:tnLst>
-      <p:par>
-        <p:cTn id="1" dur="indefinite" restart="never" nodeType="tmRoot"/>
-      </p:par>
-    </p:tnLst>
-  </p:timing>
 </p:sldLayout>
 </file>
 
@@ -341,13 +306,6 @@
   <p:clrMapOvr>
     <a:masterClrMapping/>
   </p:clrMapOvr>
-  <p:timing>
-    <p:tnLst>
-      <p:par>
-        <p:cTn id="1" dur="indefinite" restart="never" nodeType="tmRoot"/>
-      </p:par>
-    </p:tnLst>
-  </p:timing>
 </p:sldLayout>
 </file>
 
@@ -378,13 +336,6 @@
   <p:clrMapOvr>
     <a:masterClrMapping/>
   </p:clrMapOvr>
-  <p:timing>
-    <p:tnLst>
-      <p:par>
-        <p:cTn id="1" dur="indefinite" restart="never" nodeType="tmRoot"/>
-      </p:par>
-    </p:tnLst>
-  </p:timing>
 </p:sldLayout>
 </file>
 
@@ -415,13 +366,6 @@
   <p:clrMapOvr>
     <a:masterClrMapping/>
   </p:clrMapOvr>
-  <p:timing>
-    <p:tnLst>
-      <p:par>
-        <p:cTn id="1" dur="indefinite" restart="never" nodeType="tmRoot"/>
-      </p:par>
-    </p:tnLst>
-  </p:timing>
 </p:sldLayout>
 </file>
 
@@ -467,7 +411,7 @@
           <a:p>
             <a:fld id="{5001C876-01F7-4317-94B9-1AE222133113}" type="datetimeFigureOut">
               <a:rPr lang="es-ES" smtClean="0"/>
-              <a:t>28/08/2015</a:t>
+              <a:t>16/02/2016</a:t>
             </a:fld>
             <a:endParaRPr lang="es-ES"/>
           </a:p>
@@ -541,13 +485,6 @@
   <p:clrMapOvr>
     <a:masterClrMapping/>
   </p:clrMapOvr>
-  <p:timing>
-    <p:tnLst>
-      <p:par>
-        <p:cTn id="1" dur="indefinite" restart="never" nodeType="tmRoot"/>
-      </p:par>
-    </p:tnLst>
-  </p:timing>
 </p:sldLayout>
 </file>
 
@@ -578,13 +515,6 @@
   <p:clrMapOvr>
     <a:masterClrMapping/>
   </p:clrMapOvr>
-  <p:timing>
-    <p:tnLst>
-      <p:par>
-        <p:cTn id="1" dur="indefinite" restart="never" nodeType="tmRoot"/>
-      </p:par>
-    </p:tnLst>
-  </p:timing>
 </p:sldLayout>
 </file>
 
@@ -615,13 +545,6 @@
   <p:clrMapOvr>
     <a:masterClrMapping/>
   </p:clrMapOvr>
-  <p:timing>
-    <p:tnLst>
-      <p:par>
-        <p:cTn id="1" dur="indefinite" restart="never" nodeType="tmRoot"/>
-      </p:par>
-    </p:tnLst>
-  </p:timing>
 </p:sldLayout>
 </file>
 
@@ -728,13 +651,6 @@
     <p:sldLayoutId id="2147483670" r:id="rId10"/>
     <p:sldLayoutId id="2147483671" r:id="rId11"/>
   </p:sldLayoutIdLst>
-  <p:timing>
-    <p:tnLst>
-      <p:par>
-        <p:cTn id="1" dur="indefinite" restart="never" nodeType="tmRoot"/>
-      </p:par>
-    </p:tnLst>
-  </p:timing>
   <p:txStyles>
     <p:titleStyle>
       <a:lvl1pPr algn="l" defTabSz="914400" rtl="0" eaLnBrk="1" latinLnBrk="0" hangingPunct="1">
@@ -1135,12 +1051,8 @@
           <a:p>
             <a:pPr algn="ctr"/>
             <a:r>
-              <a:rPr lang="es-ES" sz="1300" b="1" dirty="0"/>
-              <a:t>s</a:t>
-            </a:r>
-            <a:r>
               <a:rPr lang="es-ES" sz="1300" b="1" dirty="0" smtClean="0"/>
-              <a:t>istema </a:t>
+              <a:t>Sistema </a:t>
             </a:r>
             <a:r>
               <a:rPr lang="es-ES" sz="1300" b="1" dirty="0" smtClean="0"/>
@@ -1200,8 +1112,8 @@
           <a:p>
             <a:pPr algn="ctr"/>
             <a:r>
-              <a:rPr lang="es-ES" sz="1300" b="1" dirty="0"/>
-              <a:t>t</a:t>
+              <a:rPr lang="es-ES" sz="1300" b="1" dirty="0" smtClean="0"/>
+              <a:t>La t</a:t>
             </a:r>
             <a:r>
               <a:rPr lang="es-ES" sz="1300" b="1" dirty="0" smtClean="0"/>
@@ -1638,7 +1550,7 @@
         <p:spPr>
           <a:xfrm>
             <a:off x="7855209" y="1798363"/>
-            <a:ext cx="1179822" cy="369332"/>
+            <a:ext cx="1179822" cy="230832"/>
           </a:xfrm>
           <a:prstGeom prst="rect">
             <a:avLst/>
@@ -1653,20 +1565,8 @@
           <a:p>
             <a:pPr algn="ctr"/>
             <a:r>
-              <a:rPr lang="en-US" sz="900" dirty="0" err="1"/>
-              <a:t>t</a:t>
-            </a:r>
-            <a:r>
               <a:rPr lang="en-US" sz="900" dirty="0" err="1" smtClean="0"/>
-              <a:t>ambién</a:t>
-            </a:r>
-            <a:r>
-              <a:rPr lang="en-US" sz="900" dirty="0" smtClean="0"/>
-              <a:t> los </a:t>
-            </a:r>
-            <a:r>
-              <a:rPr lang="en-US" sz="900" dirty="0" err="1" smtClean="0"/>
-              <a:t>identifica</a:t>
+              <a:t>Identifica</a:t>
             </a:r>
             <a:r>
               <a:rPr lang="en-US" sz="900" dirty="0" smtClean="0"/>
@@ -1674,7 +1574,11 @@
             </a:r>
             <a:r>
               <a:rPr lang="en-US" sz="900" dirty="0" err="1" smtClean="0"/>
-              <a:t>como</a:t>
+              <a:t>c</a:t>
+            </a:r>
+            <a:r>
+              <a:rPr lang="en-US" sz="900" dirty="0" err="1" smtClean="0"/>
+              <a:t>omo</a:t>
             </a:r>
             <a:endParaRPr lang="es-ES" sz="900" dirty="0"/>
           </a:p>
@@ -1738,15 +1642,7 @@
                   <a:schemeClr val="bg1"/>
                 </a:solidFill>
               </a:rPr>
-              <a:t>onfiguración </a:t>
-            </a:r>
-            <a:r>
-              <a:rPr lang="es-ES_tradnl" sz="1000" dirty="0" smtClean="0">
-                <a:solidFill>
-                  <a:schemeClr val="bg1"/>
-                </a:solidFill>
-              </a:rPr>
-              <a:t>electrónica de los elementos químicos</a:t>
+              <a:t>onfiguración electrónica de los elementos químicos</a:t>
             </a:r>
             <a:endParaRPr lang="es-ES" sz="1000" dirty="0">
               <a:solidFill>
@@ -2144,11 +2040,6 @@
               </a:rPr>
               <a:t>etales</a:t>
             </a:r>
-            <a:endParaRPr lang="es-ES" sz="1000" dirty="0" smtClean="0">
-              <a:solidFill>
-                <a:schemeClr val="bg1"/>
-              </a:solidFill>
-            </a:endParaRPr>
           </a:p>
           <a:p>
             <a:pPr marL="171450" indent="-171450">
@@ -2171,11 +2062,6 @@
               </a:rPr>
               <a:t>etaloides</a:t>
             </a:r>
-            <a:endParaRPr lang="es-ES" sz="1000" dirty="0" smtClean="0">
-              <a:solidFill>
-                <a:schemeClr val="bg1"/>
-              </a:solidFill>
-            </a:endParaRPr>
           </a:p>
           <a:p>
             <a:pPr marL="171450" indent="-171450">
@@ -2196,15 +2082,7 @@
                   <a:schemeClr val="bg1"/>
                 </a:solidFill>
               </a:rPr>
-              <a:t>o </a:t>
-            </a:r>
-            <a:r>
-              <a:rPr lang="es-ES" sz="1000" dirty="0" smtClean="0">
-                <a:solidFill>
-                  <a:schemeClr val="bg1"/>
-                </a:solidFill>
-              </a:rPr>
-              <a:t>metales</a:t>
+              <a:t>o metales</a:t>
             </a:r>
           </a:p>
           <a:p>
@@ -2226,15 +2104,7 @@
                   <a:schemeClr val="bg1"/>
                 </a:solidFill>
               </a:rPr>
-              <a:t>ases </a:t>
-            </a:r>
-            <a:r>
-              <a:rPr lang="es-ES" sz="1000" dirty="0" smtClean="0">
-                <a:solidFill>
-                  <a:schemeClr val="bg1"/>
-                </a:solidFill>
-              </a:rPr>
-              <a:t>nobles</a:t>
+              <a:t>ases nobles</a:t>
             </a:r>
             <a:endParaRPr lang="es-ES" sz="1000" dirty="0">
               <a:solidFill>
@@ -2302,15 +2172,7 @@
                   <a:schemeClr val="tx1"/>
                 </a:solidFill>
               </a:rPr>
-              <a:t>eriodos </a:t>
-            </a:r>
-            <a:r>
-              <a:rPr lang="es-ES" sz="900" dirty="0" smtClean="0">
-                <a:solidFill>
-                  <a:schemeClr val="tx1"/>
-                </a:solidFill>
-              </a:rPr>
-              <a:t>(filas)</a:t>
+              <a:t>eriodos (filas)</a:t>
             </a:r>
             <a:endParaRPr lang="es-ES" sz="900" dirty="0">
               <a:solidFill>
@@ -2331,8 +2193,8 @@
         </p:nvCxnSpPr>
         <p:spPr>
           <a:xfrm flipH="1">
-            <a:off x="8443006" y="2167695"/>
-            <a:ext cx="2114" cy="135576"/>
+            <a:off x="8443006" y="2029195"/>
+            <a:ext cx="2114" cy="274076"/>
           </a:xfrm>
           <a:prstGeom prst="straightConnector1">
             <a:avLst/>
@@ -2529,15 +2391,7 @@
                   <a:schemeClr val="bg1"/>
                 </a:solidFill>
               </a:rPr>
-              <a:t>lementos </a:t>
-            </a:r>
-            <a:r>
-              <a:rPr lang="es-ES_tradnl" sz="1000" dirty="0" smtClean="0">
-                <a:solidFill>
-                  <a:schemeClr val="bg1"/>
-                </a:solidFill>
-              </a:rPr>
-              <a:t>químicos</a:t>
+              <a:t>lementos químicos</a:t>
             </a:r>
             <a:endParaRPr lang="es-ES" sz="1000" dirty="0">
               <a:solidFill>
@@ -2775,15 +2629,7 @@
                   <a:schemeClr val="tx1"/>
                 </a:solidFill>
               </a:rPr>
-              <a:t>rupos </a:t>
-            </a:r>
-            <a:r>
-              <a:rPr lang="es-ES_tradnl" sz="900" dirty="0" smtClean="0">
-                <a:solidFill>
-                  <a:schemeClr val="tx1"/>
-                </a:solidFill>
-              </a:rPr>
-              <a:t>(columnas)</a:t>
+              <a:t>rupos (columnas)</a:t>
             </a:r>
             <a:endParaRPr lang="es-ES" sz="900" dirty="0">
               <a:solidFill>
@@ -2889,11 +2735,6 @@
               </a:rPr>
               <a:t>ivel</a:t>
             </a:r>
-            <a:endParaRPr lang="es-ES" sz="900" dirty="0" smtClean="0">
-              <a:solidFill>
-                <a:schemeClr val="tx1"/>
-              </a:solidFill>
-            </a:endParaRPr>
           </a:p>
           <a:p>
             <a:pPr marL="171450" indent="-171450">
@@ -2916,11 +2757,6 @@
               </a:rPr>
               <a:t>ubnivel</a:t>
             </a:r>
-            <a:endParaRPr lang="es-ES" sz="900" dirty="0" smtClean="0">
-              <a:solidFill>
-                <a:schemeClr val="tx1"/>
-              </a:solidFill>
-            </a:endParaRPr>
           </a:p>
           <a:p>
             <a:pPr marL="171450" indent="-171450">
@@ -3054,7 +2890,6 @@
               <a:rPr lang="es-ES_tradnl" sz="900" dirty="0" smtClean="0"/>
               <a:t>valencia,</a:t>
             </a:r>
-            <a:endParaRPr lang="es-ES_tradnl" sz="900" dirty="0" smtClean="0"/>
           </a:p>
           <a:p>
             <a:pPr marL="171450" indent="-171450">
@@ -3079,7 +2914,7 @@
             </a:r>
             <a:r>
               <a:rPr lang="es-ES_tradnl" sz="900" dirty="0" smtClean="0"/>
-              <a:t>similares.</a:t>
+              <a:t>similares,</a:t>
             </a:r>
             <a:endParaRPr lang="es-ES_tradnl" sz="900" dirty="0" smtClean="0"/>
           </a:p>
@@ -3089,8 +2924,12 @@
               <a:buChar char="•"/>
             </a:pPr>
             <a:r>
+              <a:rPr lang="es-ES_tradnl" sz="900" dirty="0"/>
+              <a:t>a</a:t>
+            </a:r>
+            <a:r>
               <a:rPr lang="es-ES_tradnl" sz="900" dirty="0" smtClean="0"/>
-              <a:t>Algunos </a:t>
+              <a:t>lgunos </a:t>
             </a:r>
             <a:r>
               <a:rPr lang="es-ES_tradnl" sz="900" dirty="0"/>
@@ -3332,15 +3171,7 @@
                   <a:schemeClr val="bg1"/>
                 </a:solidFill>
               </a:rPr>
-              <a:t>ropiedades </a:t>
-            </a:r>
-            <a:r>
-              <a:rPr lang="es-ES" sz="1000" dirty="0" smtClean="0">
-                <a:solidFill>
-                  <a:schemeClr val="bg1"/>
-                </a:solidFill>
-              </a:rPr>
-              <a:t>periódicas</a:t>
+              <a:t>ropiedades periódicas</a:t>
             </a:r>
             <a:endParaRPr lang="es-ES" sz="1000" dirty="0">
               <a:solidFill>
@@ -3409,15 +3240,7 @@
             <a:pPr algn="ctr"/>
             <a:r>
               <a:rPr lang="es-ES_tradnl" sz="900" dirty="0" smtClean="0"/>
-              <a:t>y </a:t>
-            </a:r>
-            <a:r>
-              <a:rPr lang="es-ES_tradnl" sz="900" dirty="0" smtClean="0"/>
-              <a:t>permite </a:t>
-            </a:r>
-            <a:r>
-              <a:rPr lang="es-ES_tradnl" sz="900" dirty="0" smtClean="0"/>
-              <a:t>identificar</a:t>
+              <a:t>y permite identificar</a:t>
             </a:r>
             <a:endParaRPr lang="es-ES" sz="900" dirty="0"/>
           </a:p>
@@ -3483,16 +3306,20 @@
           <a:p>
             <a:pPr algn="ctr"/>
             <a:r>
-              <a:rPr lang="en-US" sz="900" dirty="0"/>
-              <a:t>p</a:t>
+              <a:rPr lang="en-US" sz="900" dirty="0" smtClean="0"/>
+              <a:t>pre</a:t>
             </a:r>
             <a:r>
               <a:rPr lang="es-ES_tradnl" sz="900" dirty="0" err="1" smtClean="0"/>
-              <a:t>resentes</a:t>
+              <a:t>sentes</a:t>
             </a:r>
             <a:r>
               <a:rPr lang="es-ES_tradnl" sz="900" dirty="0" smtClean="0"/>
-              <a:t> en la</a:t>
+              <a:t> </a:t>
+            </a:r>
+            <a:r>
+              <a:rPr lang="es-ES_tradnl" sz="900" dirty="0" smtClean="0"/>
+              <a:t>en la</a:t>
             </a:r>
             <a:endParaRPr lang="es-ES" sz="900" dirty="0"/>
           </a:p>
@@ -4564,13 +4391,6 @@
       </p:transition>
     </mc:Fallback>
   </mc:AlternateContent>
-  <p:timing>
-    <p:tnLst>
-      <p:par>
-        <p:cTn id="1" dur="indefinite" restart="never" nodeType="tmRoot"/>
-      </p:par>
-    </p:tnLst>
-  </p:timing>
 </p:sld>
 </file>
 

</xml_diff>